<commit_message>
almost done with this shit
that's right, shit.

SHIT SHIT SHIT
</commit_message>
<xml_diff>
--- a/documents/Presentations/SegmentPresentation/SegmentPresentation.pptx
+++ b/documents/Presentations/SegmentPresentation/SegmentPresentation.pptx
@@ -32,20 +32,20 @@
       <p:boldItalic r:id="rId20"/>
     </p:embeddedFont>
     <p:embeddedFont>
+      <p:font typeface="Chinese Rocks Rg" panose="00000400000000000000" pitchFamily="50" charset="0"/>
+      <p:regular r:id="rId21"/>
+    </p:embeddedFont>
+    <p:embeddedFont>
       <p:font typeface="Open Sans" panose="020B0606030504020204" pitchFamily="34" charset="0"/>
-      <p:regular r:id="rId21"/>
-      <p:bold r:id="rId22"/>
-      <p:italic r:id="rId23"/>
-      <p:boldItalic r:id="rId24"/>
+      <p:regular r:id="rId22"/>
+      <p:bold r:id="rId23"/>
+      <p:italic r:id="rId24"/>
+      <p:boldItalic r:id="rId25"/>
     </p:embeddedFont>
     <p:embeddedFont>
       <p:font typeface="Calibri Light" panose="020F0302020204030204" pitchFamily="34" charset="0"/>
-      <p:regular r:id="rId25"/>
-      <p:italic r:id="rId26"/>
-    </p:embeddedFont>
-    <p:embeddedFont>
-      <p:font typeface="Chinese Rocks Rg" panose="00000400000000000000" pitchFamily="50" charset="0"/>
-      <p:regular r:id="rId27"/>
+      <p:regular r:id="rId26"/>
+      <p:italic r:id="rId27"/>
     </p:embeddedFont>
   </p:embeddedFontLst>
   <p:defaultTextStyle>
@@ -3272,13 +3272,7 @@
               <a:rPr lang="en-US" dirty="0" smtClean="0">
                 <a:latin typeface="Chinese Rocks Rg" panose="00000400000000000000" pitchFamily="2" charset="0"/>
               </a:rPr>
-              <a:t>Rubric: </a:t>
-            </a:r>
-            <a:r>
-              <a:rPr lang="en-US" dirty="0" smtClean="0">
-                <a:latin typeface="Chinese Rocks Rg" panose="00000400000000000000" pitchFamily="2" charset="0"/>
-              </a:rPr>
-              <a:t>Engine</a:t>
+              <a:t>Rubric: Engine</a:t>
             </a:r>
             <a:endParaRPr lang="en-US" dirty="0">
               <a:latin typeface="Chinese Rocks Rg" panose="00000400000000000000" pitchFamily="2" charset="0"/>
@@ -3341,22 +3335,357 @@
           </a:p>
         </p:txBody>
       </p:sp>
-      <p:sp>
-        <p:nvSpPr>
-          <p:cNvPr id="3" name="Content Placeholder 2"/>
-          <p:cNvSpPr>
-            <a:spLocks noGrp="1"/>
-          </p:cNvSpPr>
-          <p:nvPr>
-            <p:ph idx="1"/>
-          </p:nvPr>
-        </p:nvSpPr>
-        <p:spPr/>
-        <p:txBody>
-          <a:bodyPr/>
-          <a:lstStyle/>
-          <a:p>
-            <a:endParaRPr lang="en-US"/>
+      <p:pic>
+        <p:nvPicPr>
+          <p:cNvPr id="4" name="Picture 3"/>
+          <p:cNvPicPr>
+            <a:picLocks noChangeAspect="1"/>
+          </p:cNvPicPr>
+          <p:nvPr/>
+        </p:nvPicPr>
+        <p:blipFill>
+          <a:blip r:embed="rId2">
+            <a:extLst>
+              <a:ext uri="{28A0092B-C50C-407E-A947-70E740481C1C}">
+                <a14:useLocalDpi xmlns:a14="http://schemas.microsoft.com/office/drawing/2010/main" val="0"/>
+              </a:ext>
+            </a:extLst>
+          </a:blip>
+          <a:stretch>
+            <a:fillRect/>
+          </a:stretch>
+        </p:blipFill>
+        <p:spPr>
+          <a:xfrm>
+            <a:off x="3176180" y="2485894"/>
+            <a:ext cx="5839640" cy="1886213"/>
+          </a:xfrm>
+          <a:prstGeom prst="rect">
+            <a:avLst/>
+          </a:prstGeom>
+        </p:spPr>
+      </p:pic>
+      <p:sp>
+        <p:nvSpPr>
+          <p:cNvPr id="7" name="TextBox 6"/>
+          <p:cNvSpPr txBox="1"/>
+          <p:nvPr/>
+        </p:nvSpPr>
+        <p:spPr>
+          <a:xfrm>
+            <a:off x="8341315" y="2476368"/>
+            <a:ext cx="831260" cy="369332"/>
+          </a:xfrm>
+          <a:prstGeom prst="rect">
+            <a:avLst/>
+          </a:prstGeom>
+          <a:noFill/>
+        </p:spPr>
+        <p:txBody>
+          <a:bodyPr wrap="square" rtlCol="0">
+            <a:spAutoFit/>
+          </a:bodyPr>
+          <a:lstStyle/>
+          <a:p>
+            <a:r>
+              <a:rPr lang="en-US" dirty="0" smtClean="0">
+                <a:solidFill>
+                  <a:schemeClr val="bg1"/>
+                </a:solidFill>
+              </a:rPr>
+              <a:t>+</a:t>
+            </a:r>
+            <a:r>
+              <a:rPr lang="en-US" dirty="0" err="1" smtClean="0">
+                <a:solidFill>
+                  <a:schemeClr val="bg1"/>
+                </a:solidFill>
+              </a:rPr>
+              <a:t>eric</a:t>
+            </a:r>
+            <a:r>
+              <a:rPr lang="en-US" dirty="0" smtClean="0">
+                <a:solidFill>
+                  <a:schemeClr val="bg1"/>
+                </a:solidFill>
+              </a:rPr>
+              <a:t>%</a:t>
+            </a:r>
+            <a:endParaRPr lang="en-US" dirty="0">
+              <a:solidFill>
+                <a:schemeClr val="bg1"/>
+              </a:solidFill>
+            </a:endParaRPr>
+          </a:p>
+        </p:txBody>
+      </p:sp>
+      <p:sp>
+        <p:nvSpPr>
+          <p:cNvPr id="8" name="TextBox 7"/>
+          <p:cNvSpPr txBox="1"/>
+          <p:nvPr/>
+        </p:nvSpPr>
+        <p:spPr>
+          <a:xfrm>
+            <a:off x="8341315" y="2790691"/>
+            <a:ext cx="831260" cy="369332"/>
+          </a:xfrm>
+          <a:prstGeom prst="rect">
+            <a:avLst/>
+          </a:prstGeom>
+          <a:noFill/>
+        </p:spPr>
+        <p:txBody>
+          <a:bodyPr wrap="square" rtlCol="0">
+            <a:spAutoFit/>
+          </a:bodyPr>
+          <a:lstStyle/>
+          <a:p>
+            <a:r>
+              <a:rPr lang="en-US" dirty="0" smtClean="0">
+                <a:solidFill>
+                  <a:schemeClr val="bg1"/>
+                </a:solidFill>
+              </a:rPr>
+              <a:t>+</a:t>
+            </a:r>
+            <a:r>
+              <a:rPr lang="en-US" dirty="0" err="1" smtClean="0">
+                <a:solidFill>
+                  <a:schemeClr val="bg1"/>
+                </a:solidFill>
+              </a:rPr>
+              <a:t>eric</a:t>
+            </a:r>
+            <a:r>
+              <a:rPr lang="en-US" dirty="0" smtClean="0">
+                <a:solidFill>
+                  <a:schemeClr val="bg1"/>
+                </a:solidFill>
+              </a:rPr>
+              <a:t>%</a:t>
+            </a:r>
+            <a:endParaRPr lang="en-US" dirty="0">
+              <a:solidFill>
+                <a:schemeClr val="bg1"/>
+              </a:solidFill>
+            </a:endParaRPr>
+          </a:p>
+        </p:txBody>
+      </p:sp>
+      <p:sp>
+        <p:nvSpPr>
+          <p:cNvPr id="9" name="TextBox 8"/>
+          <p:cNvSpPr txBox="1"/>
+          <p:nvPr/>
+        </p:nvSpPr>
+        <p:spPr>
+          <a:xfrm>
+            <a:off x="8341315" y="3089554"/>
+            <a:ext cx="831260" cy="369332"/>
+          </a:xfrm>
+          <a:prstGeom prst="rect">
+            <a:avLst/>
+          </a:prstGeom>
+          <a:noFill/>
+        </p:spPr>
+        <p:txBody>
+          <a:bodyPr wrap="square" rtlCol="0">
+            <a:spAutoFit/>
+          </a:bodyPr>
+          <a:lstStyle/>
+          <a:p>
+            <a:r>
+              <a:rPr lang="en-US" dirty="0" smtClean="0">
+                <a:solidFill>
+                  <a:schemeClr val="bg1"/>
+                </a:solidFill>
+              </a:rPr>
+              <a:t>+</a:t>
+            </a:r>
+            <a:r>
+              <a:rPr lang="en-US" dirty="0" err="1" smtClean="0">
+                <a:solidFill>
+                  <a:schemeClr val="bg1"/>
+                </a:solidFill>
+              </a:rPr>
+              <a:t>eric</a:t>
+            </a:r>
+            <a:r>
+              <a:rPr lang="en-US" dirty="0" smtClean="0">
+                <a:solidFill>
+                  <a:schemeClr val="bg1"/>
+                </a:solidFill>
+              </a:rPr>
+              <a:t>%</a:t>
+            </a:r>
+            <a:endParaRPr lang="en-US" dirty="0">
+              <a:solidFill>
+                <a:schemeClr val="bg1"/>
+              </a:solidFill>
+            </a:endParaRPr>
+          </a:p>
+        </p:txBody>
+      </p:sp>
+      <p:sp>
+        <p:nvSpPr>
+          <p:cNvPr id="13" name="TextBox 12"/>
+          <p:cNvSpPr txBox="1"/>
+          <p:nvPr/>
+        </p:nvSpPr>
+        <p:spPr>
+          <a:xfrm>
+            <a:off x="8341315" y="3387075"/>
+            <a:ext cx="831260" cy="369332"/>
+          </a:xfrm>
+          <a:prstGeom prst="rect">
+            <a:avLst/>
+          </a:prstGeom>
+          <a:noFill/>
+        </p:spPr>
+        <p:txBody>
+          <a:bodyPr wrap="square" rtlCol="0">
+            <a:spAutoFit/>
+          </a:bodyPr>
+          <a:lstStyle/>
+          <a:p>
+            <a:r>
+              <a:rPr lang="en-US" dirty="0" smtClean="0">
+                <a:solidFill>
+                  <a:schemeClr val="bg1"/>
+                </a:solidFill>
+              </a:rPr>
+              <a:t>+</a:t>
+            </a:r>
+            <a:r>
+              <a:rPr lang="en-US" dirty="0" err="1" smtClean="0">
+                <a:solidFill>
+                  <a:schemeClr val="bg1"/>
+                </a:solidFill>
+              </a:rPr>
+              <a:t>eric</a:t>
+            </a:r>
+            <a:r>
+              <a:rPr lang="en-US" dirty="0" smtClean="0">
+                <a:solidFill>
+                  <a:schemeClr val="bg1"/>
+                </a:solidFill>
+              </a:rPr>
+              <a:t>%</a:t>
+            </a:r>
+            <a:endParaRPr lang="en-US" dirty="0">
+              <a:solidFill>
+                <a:schemeClr val="bg1"/>
+              </a:solidFill>
+            </a:endParaRPr>
+          </a:p>
+        </p:txBody>
+      </p:sp>
+      <p:sp>
+        <p:nvSpPr>
+          <p:cNvPr id="14" name="TextBox 13"/>
+          <p:cNvSpPr txBox="1"/>
+          <p:nvPr/>
+        </p:nvSpPr>
+        <p:spPr>
+          <a:xfrm>
+            <a:off x="8341315" y="3701398"/>
+            <a:ext cx="831260" cy="369332"/>
+          </a:xfrm>
+          <a:prstGeom prst="rect">
+            <a:avLst/>
+          </a:prstGeom>
+          <a:noFill/>
+        </p:spPr>
+        <p:txBody>
+          <a:bodyPr wrap="square" rtlCol="0">
+            <a:spAutoFit/>
+          </a:bodyPr>
+          <a:lstStyle/>
+          <a:p>
+            <a:r>
+              <a:rPr lang="en-US" dirty="0" smtClean="0">
+                <a:solidFill>
+                  <a:schemeClr val="bg1"/>
+                </a:solidFill>
+              </a:rPr>
+              <a:t>+</a:t>
+            </a:r>
+            <a:r>
+              <a:rPr lang="en-US" dirty="0" err="1" smtClean="0">
+                <a:solidFill>
+                  <a:schemeClr val="bg1"/>
+                </a:solidFill>
+              </a:rPr>
+              <a:t>eric</a:t>
+            </a:r>
+            <a:r>
+              <a:rPr lang="en-US" dirty="0" smtClean="0">
+                <a:solidFill>
+                  <a:schemeClr val="bg1"/>
+                </a:solidFill>
+              </a:rPr>
+              <a:t>%</a:t>
+            </a:r>
+            <a:endParaRPr lang="en-US" dirty="0">
+              <a:solidFill>
+                <a:schemeClr val="bg1"/>
+              </a:solidFill>
+            </a:endParaRPr>
+          </a:p>
+        </p:txBody>
+      </p:sp>
+      <p:sp>
+        <p:nvSpPr>
+          <p:cNvPr id="15" name="TextBox 14"/>
+          <p:cNvSpPr txBox="1"/>
+          <p:nvPr/>
+        </p:nvSpPr>
+        <p:spPr>
+          <a:xfrm>
+            <a:off x="8341315" y="4000261"/>
+            <a:ext cx="831260" cy="369332"/>
+          </a:xfrm>
+          <a:prstGeom prst="rect">
+            <a:avLst/>
+          </a:prstGeom>
+          <a:noFill/>
+        </p:spPr>
+        <p:txBody>
+          <a:bodyPr wrap="square" rtlCol="0">
+            <a:spAutoFit/>
+          </a:bodyPr>
+          <a:lstStyle/>
+          <a:p>
+            <a:r>
+              <a:rPr lang="en-US" dirty="0" smtClean="0">
+                <a:solidFill>
+                  <a:schemeClr val="bg1"/>
+                </a:solidFill>
+              </a:rPr>
+              <a:t>+</a:t>
+            </a:r>
+            <a:r>
+              <a:rPr lang="en-US" dirty="0" err="1" smtClean="0">
+                <a:solidFill>
+                  <a:schemeClr val="bg1"/>
+                </a:solidFill>
+              </a:rPr>
+              <a:t>eric</a:t>
+            </a:r>
+            <a:r>
+              <a:rPr lang="en-US" dirty="0" smtClean="0">
+                <a:solidFill>
+                  <a:schemeClr val="bg1"/>
+                </a:solidFill>
+              </a:rPr>
+              <a:t>%</a:t>
+            </a:r>
+            <a:endParaRPr lang="en-US" dirty="0">
+              <a:solidFill>
+                <a:schemeClr val="bg1"/>
+              </a:solidFill>
+            </a:endParaRPr>
           </a:p>
         </p:txBody>
       </p:sp>
@@ -3424,13 +3753,7 @@
               <a:rPr lang="en-US" dirty="0" smtClean="0">
                 <a:latin typeface="Chinese Rocks Rg" panose="00000400000000000000" pitchFamily="2" charset="0"/>
               </a:rPr>
-              <a:t>Rubric: </a:t>
-            </a:r>
-            <a:r>
-              <a:rPr lang="en-US" dirty="0" smtClean="0">
-                <a:latin typeface="Chinese Rocks Rg" panose="00000400000000000000" pitchFamily="2" charset="0"/>
-              </a:rPr>
-              <a:t>Content Editor</a:t>
+              <a:t>Rubric: Content Editor</a:t>
             </a:r>
             <a:endParaRPr lang="en-US" dirty="0">
               <a:latin typeface="Chinese Rocks Rg" panose="00000400000000000000" pitchFamily="2" charset="0"/>
@@ -3493,22 +3816,87 @@
           </a:p>
         </p:txBody>
       </p:sp>
-      <p:sp>
-        <p:nvSpPr>
-          <p:cNvPr id="3" name="Content Placeholder 2"/>
-          <p:cNvSpPr>
-            <a:spLocks noGrp="1"/>
-          </p:cNvSpPr>
-          <p:nvPr>
-            <p:ph idx="1"/>
-          </p:nvPr>
-        </p:nvSpPr>
-        <p:spPr/>
-        <p:txBody>
-          <a:bodyPr/>
-          <a:lstStyle/>
-          <a:p>
-            <a:endParaRPr lang="en-US"/>
+      <p:pic>
+        <p:nvPicPr>
+          <p:cNvPr id="4" name="Picture 3"/>
+          <p:cNvPicPr>
+            <a:picLocks noChangeAspect="1"/>
+          </p:cNvPicPr>
+          <p:nvPr/>
+        </p:nvPicPr>
+        <p:blipFill>
+          <a:blip r:embed="rId2">
+            <a:extLst>
+              <a:ext uri="{28A0092B-C50C-407E-A947-70E740481C1C}">
+                <a14:useLocalDpi xmlns:a14="http://schemas.microsoft.com/office/drawing/2010/main" val="0"/>
+              </a:ext>
+            </a:extLst>
+          </a:blip>
+          <a:stretch>
+            <a:fillRect/>
+          </a:stretch>
+        </p:blipFill>
+        <p:spPr>
+          <a:xfrm>
+            <a:off x="3176180" y="3252763"/>
+            <a:ext cx="5839640" cy="352474"/>
+          </a:xfrm>
+          <a:prstGeom prst="rect">
+            <a:avLst/>
+          </a:prstGeom>
+        </p:spPr>
+      </p:pic>
+      <p:sp>
+        <p:nvSpPr>
+          <p:cNvPr id="7" name="TextBox 6"/>
+          <p:cNvSpPr txBox="1"/>
+          <p:nvPr/>
+        </p:nvSpPr>
+        <p:spPr>
+          <a:xfrm>
+            <a:off x="8341315" y="3248714"/>
+            <a:ext cx="826498" cy="369332"/>
+          </a:xfrm>
+          <a:prstGeom prst="rect">
+            <a:avLst/>
+          </a:prstGeom>
+          <a:noFill/>
+        </p:spPr>
+        <p:txBody>
+          <a:bodyPr wrap="square" rtlCol="0">
+            <a:spAutoFit/>
+          </a:bodyPr>
+          <a:lstStyle/>
+          <a:p>
+            <a:r>
+              <a:rPr lang="en-US" dirty="0" smtClean="0">
+                <a:solidFill>
+                  <a:schemeClr val="bg1"/>
+                </a:solidFill>
+              </a:rPr>
+              <a:t>+</a:t>
+            </a:r>
+            <a:r>
+              <a:rPr lang="en-US" dirty="0" err="1" smtClean="0">
+                <a:solidFill>
+                  <a:schemeClr val="bg1"/>
+                </a:solidFill>
+              </a:rPr>
+              <a:t>eric</a:t>
+            </a:r>
+            <a:r>
+              <a:rPr lang="en-US" dirty="0" smtClean="0">
+                <a:solidFill>
+                  <a:schemeClr val="bg1"/>
+                </a:solidFill>
+              </a:rPr>
+              <a:t>%</a:t>
+            </a:r>
+            <a:endParaRPr lang="en-US" dirty="0">
+              <a:solidFill>
+                <a:schemeClr val="bg1"/>
+              </a:solidFill>
+            </a:endParaRPr>
           </a:p>
         </p:txBody>
       </p:sp>
@@ -3576,13 +3964,7 @@
               <a:rPr lang="en-US" dirty="0" smtClean="0">
                 <a:latin typeface="Chinese Rocks Rg" panose="00000400000000000000" pitchFamily="2" charset="0"/>
               </a:rPr>
-              <a:t>Rubric: </a:t>
-            </a:r>
-            <a:r>
-              <a:rPr lang="en-US" dirty="0" smtClean="0">
-                <a:latin typeface="Chinese Rocks Rg" panose="00000400000000000000" pitchFamily="2" charset="0"/>
-              </a:rPr>
-              <a:t>Game Play</a:t>
+              <a:t>Rubric: Game Play</a:t>
             </a:r>
             <a:endParaRPr lang="en-US" dirty="0">
               <a:latin typeface="Chinese Rocks Rg" panose="00000400000000000000" pitchFamily="2" charset="0"/>
@@ -3640,6 +4022,140 @@
               </a:ln>
               <a:solidFill>
                 <a:srgbClr val="DC1414"/>
+              </a:solidFill>
+            </a:endParaRPr>
+          </a:p>
+        </p:txBody>
+      </p:sp>
+      <p:pic>
+        <p:nvPicPr>
+          <p:cNvPr id="3" name="Picture 2"/>
+          <p:cNvPicPr>
+            <a:picLocks noChangeAspect="1"/>
+          </p:cNvPicPr>
+          <p:nvPr/>
+        </p:nvPicPr>
+        <p:blipFill rotWithShape="1">
+          <a:blip r:embed="rId2">
+            <a:extLst>
+              <a:ext uri="{28A0092B-C50C-407E-A947-70E740481C1C}">
+                <a14:useLocalDpi xmlns:a14="http://schemas.microsoft.com/office/drawing/2010/main" val="0"/>
+              </a:ext>
+            </a:extLst>
+          </a:blip>
+          <a:srcRect l="403" t="4193" r="510" b="5380"/>
+          <a:stretch/>
+        </p:blipFill>
+        <p:spPr>
+          <a:xfrm>
+            <a:off x="3207543" y="3276599"/>
+            <a:ext cx="5776914" cy="585789"/>
+          </a:xfrm>
+          <a:prstGeom prst="rect">
+            <a:avLst/>
+          </a:prstGeom>
+        </p:spPr>
+      </p:pic>
+      <p:pic>
+        <p:nvPicPr>
+          <p:cNvPr id="4" name="Picture 3"/>
+          <p:cNvPicPr>
+            <a:picLocks noChangeAspect="1"/>
+          </p:cNvPicPr>
+          <p:nvPr/>
+        </p:nvPicPr>
+        <p:blipFill rotWithShape="1">
+          <a:blip r:embed="rId3">
+            <a:extLst>
+              <a:ext uri="{28A0092B-C50C-407E-A947-70E740481C1C}">
+                <a14:useLocalDpi xmlns:a14="http://schemas.microsoft.com/office/drawing/2010/main" val="0"/>
+              </a:ext>
+            </a:extLst>
+          </a:blip>
+          <a:srcRect t="7382" r="486"/>
+          <a:stretch/>
+        </p:blipFill>
+        <p:spPr>
+          <a:xfrm>
+            <a:off x="3204602" y="2990849"/>
+            <a:ext cx="5792322" cy="317633"/>
+          </a:xfrm>
+          <a:prstGeom prst="rect">
+            <a:avLst/>
+          </a:prstGeom>
+        </p:spPr>
+      </p:pic>
+      <p:sp>
+        <p:nvSpPr>
+          <p:cNvPr id="8" name="TextBox 7"/>
+          <p:cNvSpPr txBox="1"/>
+          <p:nvPr/>
+        </p:nvSpPr>
+        <p:spPr>
+          <a:xfrm>
+            <a:off x="8341315" y="3248714"/>
+            <a:ext cx="619329" cy="369332"/>
+          </a:xfrm>
+          <a:prstGeom prst="rect">
+            <a:avLst/>
+          </a:prstGeom>
+          <a:noFill/>
+        </p:spPr>
+        <p:txBody>
+          <a:bodyPr wrap="square" rtlCol="0">
+            <a:spAutoFit/>
+          </a:bodyPr>
+          <a:lstStyle/>
+          <a:p>
+            <a:r>
+              <a:rPr lang="en-US" dirty="0" smtClean="0">
+                <a:solidFill>
+                  <a:schemeClr val="bg1"/>
+                </a:solidFill>
+              </a:rPr>
+              <a:t>+2%</a:t>
+            </a:r>
+            <a:endParaRPr lang="en-US" dirty="0">
+              <a:solidFill>
+                <a:schemeClr val="bg1"/>
+              </a:solidFill>
+            </a:endParaRPr>
+          </a:p>
+        </p:txBody>
+      </p:sp>
+      <p:sp>
+        <p:nvSpPr>
+          <p:cNvPr id="9" name="TextBox 8"/>
+          <p:cNvSpPr txBox="1"/>
+          <p:nvPr/>
+        </p:nvSpPr>
+        <p:spPr>
+          <a:xfrm>
+            <a:off x="8341313" y="3515419"/>
+            <a:ext cx="619329" cy="369332"/>
+          </a:xfrm>
+          <a:prstGeom prst="rect">
+            <a:avLst/>
+          </a:prstGeom>
+          <a:noFill/>
+        </p:spPr>
+        <p:txBody>
+          <a:bodyPr wrap="square" rtlCol="0">
+            <a:spAutoFit/>
+          </a:bodyPr>
+          <a:lstStyle/>
+          <a:p>
+            <a:r>
+              <a:rPr lang="en-US" dirty="0" smtClean="0">
+                <a:solidFill>
+                  <a:schemeClr val="bg1"/>
+                </a:solidFill>
+              </a:rPr>
+              <a:t>+1%</a:t>
+            </a:r>
+            <a:endParaRPr lang="en-US" dirty="0">
+              <a:solidFill>
+                <a:schemeClr val="bg1"/>
               </a:solidFill>
             </a:endParaRPr>
           </a:p>
@@ -3709,13 +4225,7 @@
               <a:rPr lang="en-US" dirty="0" smtClean="0">
                 <a:latin typeface="Chinese Rocks Rg" panose="00000400000000000000" pitchFamily="2" charset="0"/>
               </a:rPr>
-              <a:t>Rubric: </a:t>
-            </a:r>
-            <a:r>
-              <a:rPr lang="en-US" dirty="0" smtClean="0">
-                <a:latin typeface="Chinese Rocks Rg" panose="00000400000000000000" pitchFamily="2" charset="0"/>
-              </a:rPr>
-              <a:t>testing</a:t>
+              <a:t>Rubric: testing</a:t>
             </a:r>
             <a:endParaRPr lang="en-US" dirty="0">
               <a:latin typeface="Chinese Rocks Rg" panose="00000400000000000000" pitchFamily="2" charset="0"/>
@@ -3778,6 +4288,35 @@
           </a:p>
         </p:txBody>
       </p:sp>
+      <p:pic>
+        <p:nvPicPr>
+          <p:cNvPr id="3" name="Picture 2"/>
+          <p:cNvPicPr>
+            <a:picLocks noChangeAspect="1"/>
+          </p:cNvPicPr>
+          <p:nvPr/>
+        </p:nvPicPr>
+        <p:blipFill rotWithShape="1">
+          <a:blip r:embed="rId2">
+            <a:extLst>
+              <a:ext uri="{28A0092B-C50C-407E-A947-70E740481C1C}">
+                <a14:useLocalDpi xmlns:a14="http://schemas.microsoft.com/office/drawing/2010/main" val="0"/>
+              </a:ext>
+            </a:extLst>
+          </a:blip>
+          <a:srcRect l="578" t="2639" r="523" b="8777"/>
+          <a:stretch/>
+        </p:blipFill>
+        <p:spPr>
+          <a:xfrm>
+            <a:off x="3208337" y="3268663"/>
+            <a:ext cx="5775326" cy="320675"/>
+          </a:xfrm>
+          <a:prstGeom prst="rect">
+            <a:avLst/>
+          </a:prstGeom>
+        </p:spPr>
+      </p:pic>
     </p:spTree>
     <p:extLst>
       <p:ext uri="{BB962C8B-B14F-4D97-AF65-F5344CB8AC3E}">
@@ -3909,6 +4448,175 @@
           </a:p>
         </p:txBody>
       </p:sp>
+      <p:grpSp>
+        <p:nvGrpSpPr>
+          <p:cNvPr id="7" name="Group 6"/>
+          <p:cNvGrpSpPr/>
+          <p:nvPr/>
+        </p:nvGrpSpPr>
+        <p:grpSpPr>
+          <a:xfrm>
+            <a:off x="3202579" y="2810620"/>
+            <a:ext cx="5786843" cy="1236760"/>
+            <a:chOff x="3185704" y="3706119"/>
+            <a:chExt cx="5786843" cy="1236760"/>
+          </a:xfrm>
+        </p:grpSpPr>
+        <p:pic>
+          <p:nvPicPr>
+            <p:cNvPr id="2" name="Picture 1"/>
+            <p:cNvPicPr>
+              <a:picLocks noChangeAspect="1"/>
+            </p:cNvPicPr>
+            <p:nvPr/>
+          </p:nvPicPr>
+          <p:blipFill rotWithShape="1">
+            <a:blip r:embed="rId2">
+              <a:extLst>
+                <a:ext uri="{28A0092B-C50C-407E-A947-70E740481C1C}">
+                  <a14:useLocalDpi xmlns:a14="http://schemas.microsoft.com/office/drawing/2010/main" val="0"/>
+                </a:ext>
+              </a:extLst>
+            </a:blip>
+            <a:srcRect l="457" t="3037" r="433" b="763"/>
+            <a:stretch/>
+          </p:blipFill>
+          <p:spPr>
+            <a:xfrm>
+              <a:off x="3185705" y="3706119"/>
+              <a:ext cx="5784462" cy="302418"/>
+            </a:xfrm>
+            <a:prstGeom prst="rect">
+              <a:avLst/>
+            </a:prstGeom>
+          </p:spPr>
+        </p:pic>
+        <p:pic>
+          <p:nvPicPr>
+            <p:cNvPr id="4" name="Picture 3"/>
+            <p:cNvPicPr>
+              <a:picLocks noChangeAspect="1"/>
+            </p:cNvPicPr>
+            <p:nvPr/>
+          </p:nvPicPr>
+          <p:blipFill rotWithShape="1">
+            <a:blip r:embed="rId3">
+              <a:extLst>
+                <a:ext uri="{28A0092B-C50C-407E-A947-70E740481C1C}">
+                  <a14:useLocalDpi xmlns:a14="http://schemas.microsoft.com/office/drawing/2010/main" val="0"/>
+                </a:ext>
+              </a:extLst>
+            </a:blip>
+            <a:srcRect t="3644" r="621" b="1673"/>
+            <a:stretch/>
+          </p:blipFill>
+          <p:spPr>
+            <a:xfrm>
+              <a:off x="3185704" y="4011811"/>
+              <a:ext cx="5784465" cy="297657"/>
+            </a:xfrm>
+            <a:prstGeom prst="rect">
+              <a:avLst/>
+            </a:prstGeom>
+          </p:spPr>
+        </p:pic>
+        <p:pic>
+          <p:nvPicPr>
+            <p:cNvPr id="5" name="Picture 4"/>
+            <p:cNvPicPr>
+              <a:picLocks noChangeAspect="1"/>
+            </p:cNvPicPr>
+            <p:nvPr/>
+          </p:nvPicPr>
+          <p:blipFill rotWithShape="1">
+            <a:blip r:embed="rId4">
+              <a:extLst>
+                <a:ext uri="{28A0092B-C50C-407E-A947-70E740481C1C}">
+                  <a14:useLocalDpi xmlns:a14="http://schemas.microsoft.com/office/drawing/2010/main" val="0"/>
+                </a:ext>
+              </a:extLst>
+            </a:blip>
+            <a:srcRect t="-288" r="458" b="4713"/>
+            <a:stretch/>
+          </p:blipFill>
+          <p:spPr>
+            <a:xfrm>
+              <a:off x="3185704" y="4305300"/>
+              <a:ext cx="5784462" cy="309563"/>
+            </a:xfrm>
+            <a:prstGeom prst="rect">
+              <a:avLst/>
+            </a:prstGeom>
+          </p:spPr>
+        </p:pic>
+        <p:pic>
+          <p:nvPicPr>
+            <p:cNvPr id="6" name="Picture 5"/>
+            <p:cNvPicPr>
+              <a:picLocks noChangeAspect="1"/>
+            </p:cNvPicPr>
+            <p:nvPr/>
+          </p:nvPicPr>
+          <p:blipFill rotWithShape="1">
+            <a:blip r:embed="rId5">
+              <a:extLst>
+                <a:ext uri="{28A0092B-C50C-407E-A947-70E740481C1C}">
+                  <a14:useLocalDpi xmlns:a14="http://schemas.microsoft.com/office/drawing/2010/main" val="0"/>
+                </a:ext>
+              </a:extLst>
+            </a:blip>
+            <a:srcRect l="374" t="4381" r="537" b="9381"/>
+            <a:stretch/>
+          </p:blipFill>
+          <p:spPr>
+            <a:xfrm>
+              <a:off x="3186108" y="4614267"/>
+              <a:ext cx="5786439" cy="328612"/>
+            </a:xfrm>
+            <a:prstGeom prst="rect">
+              <a:avLst/>
+            </a:prstGeom>
+          </p:spPr>
+        </p:pic>
+      </p:grpSp>
+      <p:sp>
+        <p:nvSpPr>
+          <p:cNvPr id="9" name="TextBox 8"/>
+          <p:cNvSpPr txBox="1"/>
+          <p:nvPr/>
+        </p:nvSpPr>
+        <p:spPr>
+          <a:xfrm>
+            <a:off x="8367712" y="3698408"/>
+            <a:ext cx="619329" cy="369332"/>
+          </a:xfrm>
+          <a:prstGeom prst="rect">
+            <a:avLst/>
+          </a:prstGeom>
+          <a:noFill/>
+        </p:spPr>
+        <p:txBody>
+          <a:bodyPr wrap="square" rtlCol="0">
+            <a:spAutoFit/>
+          </a:bodyPr>
+          <a:lstStyle/>
+          <a:p>
+            <a:r>
+              <a:rPr lang="en-US" dirty="0" smtClean="0">
+                <a:solidFill>
+                  <a:schemeClr val="bg1"/>
+                </a:solidFill>
+              </a:rPr>
+              <a:t>-8%</a:t>
+            </a:r>
+            <a:endParaRPr lang="en-US" dirty="0">
+              <a:solidFill>
+                <a:schemeClr val="bg1"/>
+              </a:solidFill>
+            </a:endParaRPr>
+          </a:p>
+        </p:txBody>
+      </p:sp>
     </p:spTree>
     <p:extLst>
       <p:ext uri="{BB962C8B-B14F-4D97-AF65-F5344CB8AC3E}">
@@ -4186,11 +4894,7 @@
             </a:r>
             <a:r>
               <a:rPr lang="en-US" dirty="0" smtClean="0"/>
-              <a:t>and dealing with the </a:t>
-            </a:r>
-            <a:r>
-              <a:rPr lang="en-US" dirty="0" smtClean="0"/>
-              <a:t>inevitable.</a:t>
+              <a:t>and dealing with the inevitable.</a:t>
             </a:r>
             <a:endParaRPr lang="en-US" dirty="0"/>
           </a:p>
@@ -4747,6 +5451,96 @@
           </a:p>
         </p:txBody>
       </p:sp>
+      <p:pic>
+        <p:nvPicPr>
+          <p:cNvPr id="3" name="Picture 2"/>
+          <p:cNvPicPr>
+            <a:picLocks noChangeAspect="1"/>
+          </p:cNvPicPr>
+          <p:nvPr/>
+        </p:nvPicPr>
+        <p:blipFill>
+          <a:blip r:embed="rId2">
+            <a:extLst>
+              <a:ext uri="{28A0092B-C50C-407E-A947-70E740481C1C}">
+                <a14:useLocalDpi xmlns:a14="http://schemas.microsoft.com/office/drawing/2010/main" val="0"/>
+              </a:ext>
+            </a:extLst>
+          </a:blip>
+          <a:stretch>
+            <a:fillRect/>
+          </a:stretch>
+        </p:blipFill>
+        <p:spPr>
+          <a:xfrm>
+            <a:off x="4520075" y="2290043"/>
+            <a:ext cx="3073961" cy="3073961"/>
+          </a:xfrm>
+          <a:prstGeom prst="rect">
+            <a:avLst/>
+          </a:prstGeom>
+        </p:spPr>
+      </p:pic>
+      <p:pic>
+        <p:nvPicPr>
+          <p:cNvPr id="4" name="Picture 3"/>
+          <p:cNvPicPr>
+            <a:picLocks noChangeAspect="1"/>
+          </p:cNvPicPr>
+          <p:nvPr/>
+        </p:nvPicPr>
+        <p:blipFill>
+          <a:blip r:embed="rId3">
+            <a:extLst>
+              <a:ext uri="{28A0092B-C50C-407E-A947-70E740481C1C}">
+                <a14:useLocalDpi xmlns:a14="http://schemas.microsoft.com/office/drawing/2010/main" val="0"/>
+              </a:ext>
+            </a:extLst>
+          </a:blip>
+          <a:stretch>
+            <a:fillRect/>
+          </a:stretch>
+        </p:blipFill>
+        <p:spPr>
+          <a:xfrm>
+            <a:off x="1150755" y="2290044"/>
+            <a:ext cx="3073961" cy="3073961"/>
+          </a:xfrm>
+          <a:prstGeom prst="rect">
+            <a:avLst/>
+          </a:prstGeom>
+        </p:spPr>
+      </p:pic>
+      <p:pic>
+        <p:nvPicPr>
+          <p:cNvPr id="5" name="Picture 4"/>
+          <p:cNvPicPr>
+            <a:picLocks noChangeAspect="1"/>
+          </p:cNvPicPr>
+          <p:nvPr/>
+        </p:nvPicPr>
+        <p:blipFill>
+          <a:blip r:embed="rId4">
+            <a:extLst>
+              <a:ext uri="{28A0092B-C50C-407E-A947-70E740481C1C}">
+                <a14:useLocalDpi xmlns:a14="http://schemas.microsoft.com/office/drawing/2010/main" val="0"/>
+              </a:ext>
+            </a:extLst>
+          </a:blip>
+          <a:stretch>
+            <a:fillRect/>
+          </a:stretch>
+        </p:blipFill>
+        <p:spPr>
+          <a:xfrm>
+            <a:off x="7889395" y="2290043"/>
+            <a:ext cx="3073961" cy="3073961"/>
+          </a:xfrm>
+          <a:prstGeom prst="rect">
+            <a:avLst/>
+          </a:prstGeom>
+        </p:spPr>
+      </p:pic>
     </p:spTree>
     <p:extLst>
       <p:ext uri="{BB962C8B-B14F-4D97-AF65-F5344CB8AC3E}">
@@ -4850,13 +5644,8 @@
             </a:pPr>
             <a:r>
               <a:rPr lang="en-US" sz="2800" dirty="0" smtClean="0"/>
-              <a:t>Flexibility in game length (game occurs over single day</a:t>
-            </a:r>
-            <a:r>
-              <a:rPr lang="en-US" sz="2800" dirty="0" smtClean="0"/>
-              <a:t>).</a:t>
-            </a:r>
-            <a:endParaRPr lang="en-US" sz="2800" dirty="0" smtClean="0"/>
+              <a:t>Flexibility in game length (game occurs over single day).</a:t>
+            </a:r>
           </a:p>
           <a:p>
             <a:pPr marL="914400" lvl="1" indent="-457200">
@@ -4865,13 +5654,8 @@
             </a:pPr>
             <a:r>
               <a:rPr lang="en-US" sz="2800" dirty="0" smtClean="0"/>
-              <a:t>Events in game are component based and often data </a:t>
-            </a:r>
-            <a:r>
-              <a:rPr lang="en-US" sz="2800" dirty="0" smtClean="0"/>
-              <a:t>driven.</a:t>
-            </a:r>
-            <a:endParaRPr lang="en-US" sz="2800" dirty="0" smtClean="0"/>
+              <a:t>Events in game are component based and often data driven.</a:t>
+            </a:r>
           </a:p>
           <a:p>
             <a:pPr marL="914400" lvl="1" indent="-457200">
@@ -4880,13 +5664,8 @@
             </a:pPr>
             <a:r>
               <a:rPr lang="en-US" sz="2800" dirty="0" smtClean="0"/>
-              <a:t>Remove multiple </a:t>
-            </a:r>
-            <a:r>
-              <a:rPr lang="en-US" sz="2800" dirty="0" smtClean="0"/>
-              <a:t>endings.</a:t>
-            </a:r>
-            <a:endParaRPr lang="en-US" sz="2800" dirty="0" smtClean="0"/>
+              <a:t>Remove multiple endings.</a:t>
+            </a:r>
           </a:p>
           <a:p>
             <a:pPr marL="914400" lvl="1" indent="-457200">
@@ -4895,11 +5674,7 @@
             </a:pPr>
             <a:r>
               <a:rPr lang="en-US" sz="2800" dirty="0" smtClean="0"/>
-              <a:t>A team of self </a:t>
-            </a:r>
-            <a:r>
-              <a:rPr lang="en-US" sz="2800" dirty="0" smtClean="0"/>
-              <a:t>starters.</a:t>
+              <a:t>A team of self starters.</a:t>
             </a:r>
             <a:endParaRPr lang="en-US" dirty="0"/>
           </a:p>
@@ -5024,19 +5799,7 @@
               <a:rPr lang="en-US" dirty="0" smtClean="0">
                 <a:latin typeface="Chinese Rocks Rg" panose="00000400000000000000" pitchFamily="2" charset="0"/>
               </a:rPr>
-              <a:t>Risk </a:t>
-            </a:r>
-            <a:r>
-              <a:rPr lang="en-US" dirty="0" smtClean="0">
-                <a:latin typeface="Chinese Rocks Rg" panose="00000400000000000000" pitchFamily="2" charset="0"/>
-              </a:rPr>
-              <a:t>2: </a:t>
-            </a:r>
-            <a:r>
-              <a:rPr lang="en-US" dirty="0" smtClean="0">
-                <a:latin typeface="Chinese Rocks Rg" panose="00000400000000000000" pitchFamily="2" charset="0"/>
-              </a:rPr>
-              <a:t>Communication</a:t>
+              <a:t>Risk 2: Communication</a:t>
             </a:r>
             <a:endParaRPr lang="en-US" dirty="0">
               <a:latin typeface="Chinese Rocks Rg" panose="00000400000000000000" pitchFamily="2" charset="0"/>
@@ -5075,13 +5838,8 @@
             </a:pPr>
             <a:r>
               <a:rPr lang="en-US" sz="2800" dirty="0" smtClean="0"/>
-              <a:t>More structured team </a:t>
-            </a:r>
-            <a:r>
-              <a:rPr lang="en-US" sz="2800" dirty="0" smtClean="0"/>
-              <a:t>time where we all meet up.</a:t>
-            </a:r>
-            <a:endParaRPr lang="en-US" sz="2800" dirty="0" smtClean="0"/>
+              <a:t>More structured team time where we all meet up.</a:t>
+            </a:r>
           </a:p>
           <a:p>
             <a:pPr marL="914400" lvl="1" indent="-457200">
@@ -5090,13 +5848,8 @@
             </a:pPr>
             <a:r>
               <a:rPr lang="en-US" sz="2800" dirty="0" smtClean="0"/>
-              <a:t>Emphasis on reporting successes and failures to the rest of </a:t>
-            </a:r>
-            <a:r>
-              <a:rPr lang="en-US" sz="2800" dirty="0" smtClean="0"/>
-              <a:t>team.</a:t>
-            </a:r>
-            <a:endParaRPr lang="en-US" sz="2800" dirty="0" smtClean="0"/>
+              <a:t>Emphasis on reporting successes and failures to the rest of team.</a:t>
+            </a:r>
           </a:p>
           <a:p>
             <a:pPr marL="914400" lvl="1" indent="-457200">
@@ -5107,7 +5860,6 @@
               <a:rPr lang="en-US" sz="2800" dirty="0" smtClean="0"/>
               <a:t>Google form for weekly logs.</a:t>
             </a:r>
-            <a:endParaRPr lang="en-US" sz="2800" dirty="0" smtClean="0"/>
           </a:p>
           <a:p>
             <a:pPr marL="914400" lvl="1" indent="-457200">
@@ -5237,19 +5989,7 @@
               <a:rPr lang="en-US" dirty="0" smtClean="0">
                 <a:latin typeface="Chinese Rocks Rg" panose="00000400000000000000" pitchFamily="2" charset="0"/>
               </a:rPr>
-              <a:t>Risk </a:t>
-            </a:r>
-            <a:r>
-              <a:rPr lang="en-US" dirty="0" smtClean="0">
-                <a:latin typeface="Chinese Rocks Rg" panose="00000400000000000000" pitchFamily="2" charset="0"/>
-              </a:rPr>
-              <a:t>3: loss of </a:t>
-            </a:r>
-            <a:r>
-              <a:rPr lang="en-US" dirty="0" smtClean="0">
-                <a:latin typeface="Chinese Rocks Rg" panose="00000400000000000000" pitchFamily="2" charset="0"/>
-              </a:rPr>
-              <a:t>Artists</a:t>
+              <a:t>Risk 3: loss of Artists</a:t>
             </a:r>
             <a:endParaRPr lang="en-US" dirty="0">
               <a:latin typeface="Chinese Rocks Rg" panose="00000400000000000000" pitchFamily="2" charset="0"/>
@@ -5310,7 +6050,6 @@
               <a:rPr lang="en-US" dirty="0" smtClean="0"/>
               <a:t>Make use of the 2D art assets we already have.</a:t>
             </a:r>
-            <a:endParaRPr lang="en-US" dirty="0" smtClean="0"/>
           </a:p>
           <a:p>
             <a:pPr marL="914400" lvl="1" indent="-457200">
@@ -5321,7 +6060,6 @@
               <a:rPr lang="en-US" dirty="0" smtClean="0"/>
               <a:t>Continue to look for capable 3D artists.</a:t>
             </a:r>
-            <a:endParaRPr lang="en-US" dirty="0" smtClean="0"/>
           </a:p>
           <a:p>
             <a:pPr marL="914400" lvl="1" indent="-457200">
@@ -5524,15 +6262,7 @@
                             <a:schemeClr val="bg1"/>
                           </a:solidFill>
                         </a:rPr>
-                        <a:t>Week </a:t>
-                      </a:r>
-                      <a:r>
-                        <a:rPr lang="en-US" dirty="0" smtClean="0">
-                          <a:solidFill>
-                            <a:schemeClr val="bg1"/>
-                          </a:solidFill>
-                        </a:rPr>
-                        <a:t>9</a:t>
+                        <a:t>Week 9</a:t>
                       </a:r>
                       <a:endParaRPr lang="en-US" dirty="0">
                         <a:solidFill>
@@ -5554,15 +6284,7 @@
                             <a:schemeClr val="bg1"/>
                           </a:solidFill>
                         </a:rPr>
-                        <a:t>Week </a:t>
-                      </a:r>
-                      <a:r>
-                        <a:rPr lang="en-US" dirty="0" smtClean="0">
-                          <a:solidFill>
-                            <a:schemeClr val="bg1"/>
-                          </a:solidFill>
-                        </a:rPr>
-                        <a:t>10</a:t>
+                        <a:t>Week 10</a:t>
                       </a:r>
                       <a:endParaRPr lang="en-US" dirty="0">
                         <a:solidFill>
@@ -5584,15 +6306,7 @@
                             <a:schemeClr val="bg1"/>
                           </a:solidFill>
                         </a:rPr>
-                        <a:t>Week </a:t>
-                      </a:r>
-                      <a:r>
-                        <a:rPr lang="en-US" dirty="0" smtClean="0">
-                          <a:solidFill>
-                            <a:schemeClr val="bg1"/>
-                          </a:solidFill>
-                        </a:rPr>
-                        <a:t>11</a:t>
+                        <a:t>Week 11</a:t>
                       </a:r>
                       <a:endParaRPr lang="en-US" dirty="0">
                         <a:solidFill>

</xml_diff>